<commit_message>
Add system overview graphic
</commit_message>
<xml_diff>
--- a/doc/ACH_DOC.pptx
+++ b/doc/ACH_DOC.pptx
@@ -106,6 +106,22 @@
       </a:defRPr>
     </a:lvl9pPr>
   </p:defaultTextStyle>
+  <p:extLst>
+    <p:ext uri="{EFAFB233-063F-42B5-8137-9DF3F51BA10A}">
+      <p15:sldGuideLst xmlns:p15="http://schemas.microsoft.com/office/powerpoint/2012/main">
+        <p15:guide id="1" orient="horz" pos="2160">
+          <p15:clr>
+            <a:srgbClr val="A4A3A4"/>
+          </p15:clr>
+        </p15:guide>
+        <p15:guide id="2" pos="2880">
+          <p15:clr>
+            <a:srgbClr val="A4A3A4"/>
+          </p15:clr>
+        </p15:guide>
+      </p15:sldGuideLst>
+    </p:ext>
+  </p:extLst>
 </p:presentation>
 </file>
 
@@ -290,7 +306,7 @@
           <a:p>
             <a:fld id="{154D1BEB-9A9C-406A-9C8D-56A58EE1116F}" type="datetimeFigureOut">
               <a:rPr lang="en-US" smtClean="0"/>
-              <a:t>8/16/2012</a:t>
+              <a:t>10/2/2012</a:t>
             </a:fld>
             <a:endParaRPr lang="en-US"/>
           </a:p>
@@ -460,7 +476,7 @@
           <a:p>
             <a:fld id="{154D1BEB-9A9C-406A-9C8D-56A58EE1116F}" type="datetimeFigureOut">
               <a:rPr lang="en-US" smtClean="0"/>
-              <a:t>8/16/2012</a:t>
+              <a:t>10/2/2012</a:t>
             </a:fld>
             <a:endParaRPr lang="en-US"/>
           </a:p>
@@ -640,7 +656,7 @@
           <a:p>
             <a:fld id="{154D1BEB-9A9C-406A-9C8D-56A58EE1116F}" type="datetimeFigureOut">
               <a:rPr lang="en-US" smtClean="0"/>
-              <a:t>8/16/2012</a:t>
+              <a:t>10/2/2012</a:t>
             </a:fld>
             <a:endParaRPr lang="en-US"/>
           </a:p>
@@ -810,7 +826,7 @@
           <a:p>
             <a:fld id="{154D1BEB-9A9C-406A-9C8D-56A58EE1116F}" type="datetimeFigureOut">
               <a:rPr lang="en-US" smtClean="0"/>
-              <a:t>8/16/2012</a:t>
+              <a:t>10/2/2012</a:t>
             </a:fld>
             <a:endParaRPr lang="en-US"/>
           </a:p>
@@ -1056,7 +1072,7 @@
           <a:p>
             <a:fld id="{154D1BEB-9A9C-406A-9C8D-56A58EE1116F}" type="datetimeFigureOut">
               <a:rPr lang="en-US" smtClean="0"/>
-              <a:t>8/16/2012</a:t>
+              <a:t>10/2/2012</a:t>
             </a:fld>
             <a:endParaRPr lang="en-US"/>
           </a:p>
@@ -1344,7 +1360,7 @@
           <a:p>
             <a:fld id="{154D1BEB-9A9C-406A-9C8D-56A58EE1116F}" type="datetimeFigureOut">
               <a:rPr lang="en-US" smtClean="0"/>
-              <a:t>8/16/2012</a:t>
+              <a:t>10/2/2012</a:t>
             </a:fld>
             <a:endParaRPr lang="en-US"/>
           </a:p>
@@ -1766,7 +1782,7 @@
           <a:p>
             <a:fld id="{154D1BEB-9A9C-406A-9C8D-56A58EE1116F}" type="datetimeFigureOut">
               <a:rPr lang="en-US" smtClean="0"/>
-              <a:t>8/16/2012</a:t>
+              <a:t>10/2/2012</a:t>
             </a:fld>
             <a:endParaRPr lang="en-US"/>
           </a:p>
@@ -1884,7 +1900,7 @@
           <a:p>
             <a:fld id="{154D1BEB-9A9C-406A-9C8D-56A58EE1116F}" type="datetimeFigureOut">
               <a:rPr lang="en-US" smtClean="0"/>
-              <a:t>8/16/2012</a:t>
+              <a:t>10/2/2012</a:t>
             </a:fld>
             <a:endParaRPr lang="en-US"/>
           </a:p>
@@ -1979,7 +1995,7 @@
           <a:p>
             <a:fld id="{154D1BEB-9A9C-406A-9C8D-56A58EE1116F}" type="datetimeFigureOut">
               <a:rPr lang="en-US" smtClean="0"/>
-              <a:t>8/16/2012</a:t>
+              <a:t>10/2/2012</a:t>
             </a:fld>
             <a:endParaRPr lang="en-US"/>
           </a:p>
@@ -2256,7 +2272,7 @@
           <a:p>
             <a:fld id="{154D1BEB-9A9C-406A-9C8D-56A58EE1116F}" type="datetimeFigureOut">
               <a:rPr lang="en-US" smtClean="0"/>
-              <a:t>8/16/2012</a:t>
+              <a:t>10/2/2012</a:t>
             </a:fld>
             <a:endParaRPr lang="en-US"/>
           </a:p>
@@ -2509,7 +2525,7 @@
           <a:p>
             <a:fld id="{154D1BEB-9A9C-406A-9C8D-56A58EE1116F}" type="datetimeFigureOut">
               <a:rPr lang="en-US" smtClean="0"/>
-              <a:t>8/16/2012</a:t>
+              <a:t>10/2/2012</a:t>
             </a:fld>
             <a:endParaRPr lang="en-US"/>
           </a:p>
@@ -2722,7 +2738,7 @@
           <a:p>
             <a:fld id="{154D1BEB-9A9C-406A-9C8D-56A58EE1116F}" type="datetimeFigureOut">
               <a:rPr lang="en-US" smtClean="0"/>
-              <a:t>8/16/2012</a:t>
+              <a:t>10/2/2012</a:t>
             </a:fld>
             <a:endParaRPr lang="en-US"/>
           </a:p>
@@ -4847,660 +4863,1025 @@
           <a:chExt cx="0" cy="0"/>
         </a:xfrm>
       </p:grpSpPr>
-      <p:sp>
-        <p:nvSpPr>
-          <p:cNvPr id="4" name="Rectangle 3"/>
-          <p:cNvSpPr/>
+      <p:grpSp>
+        <p:nvGrpSpPr>
+          <p:cNvPr id="28" name="Group 27"/>
+          <p:cNvGrpSpPr/>
           <p:nvPr/>
-        </p:nvSpPr>
-        <p:spPr>
+        </p:nvGrpSpPr>
+        <p:grpSpPr>
           <a:xfrm>
-            <a:off x="228600" y="266700"/>
-            <a:ext cx="6781800" cy="6286500"/>
+            <a:off x="228600" y="228600"/>
+            <a:ext cx="7620000" cy="6553200"/>
+            <a:chOff x="228600" y="228600"/>
+            <a:chExt cx="7620000" cy="6553200"/>
           </a:xfrm>
-          <a:prstGeom prst="rect">
-            <a:avLst/>
-          </a:prstGeom>
-        </p:spPr>
-        <p:style>
-          <a:lnRef idx="2">
-            <a:schemeClr val="accent1">
-              <a:shade val="50000"/>
-            </a:schemeClr>
-          </a:lnRef>
-          <a:fillRef idx="1">
-            <a:schemeClr val="accent1"/>
-          </a:fillRef>
-          <a:effectRef idx="0">
-            <a:schemeClr val="accent1"/>
-          </a:effectRef>
-          <a:fontRef idx="minor">
-            <a:schemeClr val="lt1"/>
-          </a:fontRef>
-        </p:style>
-        <p:txBody>
-          <a:bodyPr rtlCol="0" anchor="t"/>
-          <a:lstStyle/>
-          <a:p>
-            <a:r>
-              <a:rPr lang="en-US" dirty="0" smtClean="0"/>
-              <a:t>Core Driver</a:t>
-            </a:r>
-            <a:endParaRPr lang="en-US" dirty="0"/>
-          </a:p>
-        </p:txBody>
-      </p:sp>
-      <p:sp>
-        <p:nvSpPr>
-          <p:cNvPr id="5" name="Rectangle 4"/>
-          <p:cNvSpPr/>
-          <p:nvPr/>
-        </p:nvSpPr>
-        <p:spPr>
-          <a:xfrm>
-            <a:off x="381000" y="5715000"/>
-            <a:ext cx="6172200" cy="609600"/>
-          </a:xfrm>
-          <a:prstGeom prst="rect">
-            <a:avLst/>
-          </a:prstGeom>
-        </p:spPr>
-        <p:style>
-          <a:lnRef idx="1">
-            <a:schemeClr val="accent1"/>
-          </a:lnRef>
-          <a:fillRef idx="2">
-            <a:schemeClr val="accent1"/>
-          </a:fillRef>
-          <a:effectRef idx="1">
-            <a:schemeClr val="accent1"/>
-          </a:effectRef>
-          <a:fontRef idx="minor">
-            <a:schemeClr val="dk1"/>
-          </a:fontRef>
-        </p:style>
-        <p:txBody>
-          <a:bodyPr rtlCol="0" anchor="ctr"/>
-          <a:lstStyle/>
-          <a:p>
-            <a:pPr algn="ctr"/>
-            <a:r>
-              <a:rPr lang="en-US" dirty="0" smtClean="0"/>
-              <a:t>Master Data Management</a:t>
-            </a:r>
-            <a:endParaRPr lang="en-US" dirty="0"/>
-          </a:p>
-        </p:txBody>
-      </p:sp>
-      <p:sp>
-        <p:nvSpPr>
-          <p:cNvPr id="6" name="Rectangle 5"/>
-          <p:cNvSpPr/>
-          <p:nvPr/>
-        </p:nvSpPr>
-        <p:spPr>
-          <a:xfrm>
-            <a:off x="381000" y="1371600"/>
-            <a:ext cx="6172200" cy="4114800"/>
-          </a:xfrm>
-          <a:prstGeom prst="rect">
-            <a:avLst/>
-          </a:prstGeom>
-        </p:spPr>
-        <p:style>
-          <a:lnRef idx="1">
-            <a:schemeClr val="accent5"/>
-          </a:lnRef>
-          <a:fillRef idx="2">
-            <a:schemeClr val="accent5"/>
-          </a:fillRef>
-          <a:effectRef idx="1">
-            <a:schemeClr val="accent5"/>
-          </a:effectRef>
-          <a:fontRef idx="minor">
-            <a:schemeClr val="dk1"/>
-          </a:fontRef>
-        </p:style>
-        <p:txBody>
-          <a:bodyPr rtlCol="0" anchor="t"/>
-          <a:lstStyle/>
-          <a:p>
-            <a:r>
-              <a:rPr lang="en-US" smtClean="0"/>
-              <a:t>Transaction </a:t>
-            </a:r>
-            <a:r>
-              <a:rPr lang="en-US" dirty="0" smtClean="0"/>
-              <a:t>Data Management</a:t>
-            </a:r>
-            <a:endParaRPr lang="en-US" dirty="0"/>
-          </a:p>
-        </p:txBody>
-      </p:sp>
-      <p:sp>
-        <p:nvSpPr>
-          <p:cNvPr id="7" name="Rectangle 6"/>
-          <p:cNvSpPr/>
-          <p:nvPr/>
-        </p:nvSpPr>
-        <p:spPr>
-          <a:xfrm>
-            <a:off x="5181600" y="1752600"/>
-            <a:ext cx="1181100" cy="3429000"/>
-          </a:xfrm>
-          <a:prstGeom prst="rect">
-            <a:avLst/>
-          </a:prstGeom>
-        </p:spPr>
-        <p:style>
-          <a:lnRef idx="1">
-            <a:schemeClr val="accent1"/>
-          </a:lnRef>
-          <a:fillRef idx="2">
-            <a:schemeClr val="accent1"/>
-          </a:fillRef>
-          <a:effectRef idx="1">
-            <a:schemeClr val="accent1"/>
-          </a:effectRef>
-          <a:fontRef idx="minor">
-            <a:schemeClr val="dk1"/>
-          </a:fontRef>
-        </p:style>
-        <p:txBody>
-          <a:bodyPr rtlCol="0" anchor="ctr"/>
-          <a:lstStyle/>
-          <a:p>
-            <a:pPr algn="ctr"/>
-            <a:r>
-              <a:rPr lang="en-US" dirty="0" smtClean="0"/>
-              <a:t>Ledgers</a:t>
-            </a:r>
-            <a:endParaRPr lang="en-US" dirty="0"/>
-          </a:p>
-        </p:txBody>
-      </p:sp>
-      <p:sp>
-        <p:nvSpPr>
-          <p:cNvPr id="8" name="Rectangle 7"/>
-          <p:cNvSpPr/>
-          <p:nvPr/>
-        </p:nvSpPr>
-        <p:spPr>
-          <a:xfrm>
-            <a:off x="3238500" y="1736785"/>
-            <a:ext cx="1181100" cy="1063206"/>
-          </a:xfrm>
-          <a:prstGeom prst="rect">
-            <a:avLst/>
-          </a:prstGeom>
-        </p:spPr>
-        <p:style>
-          <a:lnRef idx="1">
-            <a:schemeClr val="accent1"/>
-          </a:lnRef>
-          <a:fillRef idx="2">
-            <a:schemeClr val="accent1"/>
-          </a:fillRef>
-          <a:effectRef idx="1">
-            <a:schemeClr val="accent1"/>
-          </a:effectRef>
-          <a:fontRef idx="minor">
-            <a:schemeClr val="dk1"/>
-          </a:fontRef>
-        </p:style>
-        <p:txBody>
-          <a:bodyPr rtlCol="0" anchor="ctr"/>
-          <a:lstStyle/>
-          <a:p>
-            <a:pPr algn="ctr"/>
-            <a:r>
-              <a:rPr lang="en-US" dirty="0" smtClean="0"/>
-              <a:t>Document Entry</a:t>
-            </a:r>
-            <a:endParaRPr lang="en-US" dirty="0"/>
-          </a:p>
-        </p:txBody>
-      </p:sp>
-      <p:cxnSp>
-        <p:nvCxnSpPr>
-          <p:cNvPr id="16" name="Elbow Connector 15"/>
-          <p:cNvCxnSpPr>
-            <a:stCxn id="8" idx="3"/>
-            <a:endCxn id="7" idx="1"/>
-          </p:cNvCxnSpPr>
-          <p:nvPr/>
-        </p:nvCxnSpPr>
-        <p:spPr>
-          <a:xfrm>
-            <a:off x="4419600" y="2268388"/>
-            <a:ext cx="762000" cy="1198712"/>
-          </a:xfrm>
-          <a:prstGeom prst="bentConnector3">
-            <a:avLst/>
-          </a:prstGeom>
-          <a:ln>
-            <a:tailEnd type="arrow"/>
-          </a:ln>
-        </p:spPr>
-        <p:style>
-          <a:lnRef idx="2">
-            <a:schemeClr val="dk1"/>
-          </a:lnRef>
-          <a:fillRef idx="0">
-            <a:schemeClr val="dk1"/>
-          </a:fillRef>
-          <a:effectRef idx="1">
-            <a:schemeClr val="dk1"/>
-          </a:effectRef>
-          <a:fontRef idx="minor">
-            <a:schemeClr val="tx1"/>
-          </a:fontRef>
-        </p:style>
-      </p:cxnSp>
-      <p:cxnSp>
-        <p:nvCxnSpPr>
-          <p:cNvPr id="17" name="Elbow Connector 16"/>
-          <p:cNvCxnSpPr>
-            <a:stCxn id="5" idx="0"/>
-            <a:endCxn id="6" idx="2"/>
-          </p:cNvCxnSpPr>
-          <p:nvPr/>
-        </p:nvCxnSpPr>
-        <p:spPr>
-          <a:xfrm rot="5400000" flipH="1" flipV="1">
-            <a:off x="3352800" y="5600700"/>
-            <a:ext cx="228600" cy="12700"/>
-          </a:xfrm>
-          <a:prstGeom prst="bentConnector3">
-            <a:avLst>
-              <a:gd name="adj1" fmla="val 50000"/>
-            </a:avLst>
-          </a:prstGeom>
-          <a:ln>
-            <a:tailEnd type="arrow"/>
-          </a:ln>
-        </p:spPr>
-        <p:style>
-          <a:lnRef idx="2">
-            <a:schemeClr val="dk1"/>
-          </a:lnRef>
-          <a:fillRef idx="0">
-            <a:schemeClr val="dk1"/>
-          </a:fillRef>
-          <a:effectRef idx="1">
-            <a:schemeClr val="dk1"/>
-          </a:effectRef>
-          <a:fontRef idx="minor">
-            <a:schemeClr val="tx1"/>
-          </a:fontRef>
-        </p:style>
-      </p:cxnSp>
-      <p:sp>
-        <p:nvSpPr>
-          <p:cNvPr id="26" name="Rectangle 25"/>
-          <p:cNvSpPr/>
-          <p:nvPr/>
-        </p:nvSpPr>
-        <p:spPr>
-          <a:xfrm>
-            <a:off x="3238500" y="3048000"/>
-            <a:ext cx="1181100" cy="1063206"/>
-          </a:xfrm>
-          <a:prstGeom prst="rect">
-            <a:avLst/>
-          </a:prstGeom>
-        </p:spPr>
-        <p:style>
-          <a:lnRef idx="1">
-            <a:schemeClr val="accent1"/>
-          </a:lnRef>
-          <a:fillRef idx="2">
-            <a:schemeClr val="accent1"/>
-          </a:fillRef>
-          <a:effectRef idx="1">
-            <a:schemeClr val="accent1"/>
-          </a:effectRef>
-          <a:fontRef idx="minor">
-            <a:schemeClr val="dk1"/>
-          </a:fontRef>
-        </p:style>
-        <p:txBody>
-          <a:bodyPr rtlCol="0" anchor="ctr"/>
-          <a:lstStyle/>
-          <a:p>
-            <a:pPr algn="ctr"/>
-            <a:r>
-              <a:rPr lang="en-US" altLang="zh-CN" dirty="0" smtClean="0"/>
-              <a:t>G/L Balance</a:t>
-            </a:r>
-            <a:endParaRPr lang="en-US" dirty="0"/>
-          </a:p>
-        </p:txBody>
-      </p:sp>
-      <p:cxnSp>
-        <p:nvCxnSpPr>
-          <p:cNvPr id="29" name="Elbow Connector 28"/>
-          <p:cNvCxnSpPr>
-            <a:stCxn id="7" idx="2"/>
-            <a:endCxn id="26" idx="3"/>
-          </p:cNvCxnSpPr>
-          <p:nvPr/>
-        </p:nvCxnSpPr>
-        <p:spPr>
-          <a:xfrm rot="5400000" flipH="1">
-            <a:off x="4294876" y="3704327"/>
-            <a:ext cx="1601997" cy="1352550"/>
-          </a:xfrm>
-          <a:prstGeom prst="bentConnector4">
-            <a:avLst>
-              <a:gd name="adj1" fmla="val -14270"/>
-              <a:gd name="adj2" fmla="val 71831"/>
-            </a:avLst>
-          </a:prstGeom>
-          <a:ln>
-            <a:tailEnd type="arrow"/>
-          </a:ln>
-        </p:spPr>
-        <p:style>
-          <a:lnRef idx="2">
-            <a:schemeClr val="dk1"/>
-          </a:lnRef>
-          <a:fillRef idx="0">
-            <a:schemeClr val="dk1"/>
-          </a:fillRef>
-          <a:effectRef idx="1">
-            <a:schemeClr val="dk1"/>
-          </a:effectRef>
-          <a:fontRef idx="minor">
-            <a:schemeClr val="tx1"/>
-          </a:fontRef>
-        </p:style>
-      </p:cxnSp>
-      <p:sp>
-        <p:nvSpPr>
-          <p:cNvPr id="34" name="Rectangle 33"/>
-          <p:cNvSpPr/>
-          <p:nvPr/>
-        </p:nvSpPr>
-        <p:spPr>
-          <a:xfrm>
-            <a:off x="1066800" y="1752600"/>
-            <a:ext cx="1181100" cy="1063206"/>
-          </a:xfrm>
-          <a:prstGeom prst="rect">
-            <a:avLst/>
-          </a:prstGeom>
-        </p:spPr>
-        <p:style>
-          <a:lnRef idx="1">
-            <a:schemeClr val="accent1"/>
-          </a:lnRef>
-          <a:fillRef idx="2">
-            <a:schemeClr val="accent1"/>
-          </a:fillRef>
-          <a:effectRef idx="1">
-            <a:schemeClr val="accent1"/>
-          </a:effectRef>
-          <a:fontRef idx="minor">
-            <a:schemeClr val="dk1"/>
-          </a:fontRef>
-        </p:style>
-        <p:txBody>
-          <a:bodyPr rtlCol="0" anchor="ctr"/>
-          <a:lstStyle/>
-          <a:p>
-            <a:pPr algn="ctr"/>
-            <a:r>
-              <a:rPr lang="en-US" dirty="0" smtClean="0"/>
-              <a:t>G/L, Customer, Vendor Entry</a:t>
-            </a:r>
-            <a:endParaRPr lang="en-US" dirty="0"/>
-          </a:p>
-        </p:txBody>
-      </p:sp>
-      <p:sp>
-        <p:nvSpPr>
-          <p:cNvPr id="38" name="Rectangle 37"/>
-          <p:cNvSpPr/>
-          <p:nvPr/>
-        </p:nvSpPr>
-        <p:spPr>
-          <a:xfrm>
-            <a:off x="1066800" y="3124200"/>
-            <a:ext cx="1181100" cy="987006"/>
-          </a:xfrm>
-          <a:prstGeom prst="rect">
-            <a:avLst/>
-          </a:prstGeom>
-        </p:spPr>
-        <p:style>
-          <a:lnRef idx="1">
-            <a:schemeClr val="accent1"/>
-          </a:lnRef>
-          <a:fillRef idx="2">
-            <a:schemeClr val="accent1"/>
-          </a:fillRef>
-          <a:effectRef idx="1">
-            <a:schemeClr val="accent1"/>
-          </a:effectRef>
-          <a:fontRef idx="minor">
-            <a:schemeClr val="dk1"/>
-          </a:fontRef>
-        </p:style>
-        <p:txBody>
-          <a:bodyPr rot="0" spcFirstLastPara="0" vertOverflow="overflow" horzOverflow="overflow" vert="horz" wrap="square" lIns="91440" tIns="45720" rIns="91440" bIns="45720" numCol="1" spcCol="0" rtlCol="0" fromWordArt="0" anchor="ctr" anchorCtr="0" forceAA="0" compatLnSpc="1">
-            <a:prstTxWarp prst="textNoShape">
+        </p:grpSpPr>
+        <p:sp>
+          <p:nvSpPr>
+            <p:cNvPr id="4" name="Rectangle 3"/>
+            <p:cNvSpPr/>
+            <p:nvPr/>
+          </p:nvSpPr>
+          <p:spPr>
+            <a:xfrm>
+              <a:off x="228600" y="228600"/>
+              <a:ext cx="7620000" cy="6553200"/>
+            </a:xfrm>
+            <a:prstGeom prst="rect">
               <a:avLst/>
-            </a:prstTxWarp>
-            <a:noAutofit/>
-          </a:bodyPr>
-          <a:lstStyle/>
-          <a:p>
-            <a:pPr algn="ctr"/>
-            <a:r>
-              <a:rPr lang="en-US" dirty="0" smtClean="0"/>
-              <a:t>Reverse</a:t>
-            </a:r>
-          </a:p>
-        </p:txBody>
-      </p:sp>
-      <p:cxnSp>
-        <p:nvCxnSpPr>
-          <p:cNvPr id="39" name="Elbow Connector 38"/>
-          <p:cNvCxnSpPr>
-            <a:stCxn id="38" idx="3"/>
-            <a:endCxn id="8" idx="1"/>
-          </p:cNvCxnSpPr>
-          <p:nvPr/>
-        </p:nvCxnSpPr>
-        <p:spPr>
-          <a:xfrm flipV="1">
-            <a:off x="2247900" y="2268388"/>
-            <a:ext cx="990600" cy="1349315"/>
-          </a:xfrm>
-          <a:prstGeom prst="bentConnector3">
-            <a:avLst>
-              <a:gd name="adj1" fmla="val 50000"/>
-            </a:avLst>
-          </a:prstGeom>
-          <a:ln>
-            <a:tailEnd type="arrow"/>
-          </a:ln>
-        </p:spPr>
-        <p:style>
-          <a:lnRef idx="2">
-            <a:schemeClr val="dk1"/>
-          </a:lnRef>
-          <a:fillRef idx="0">
-            <a:schemeClr val="dk1"/>
-          </a:fillRef>
-          <a:effectRef idx="1">
-            <a:schemeClr val="dk1"/>
-          </a:effectRef>
-          <a:fontRef idx="minor">
-            <a:schemeClr val="tx1"/>
-          </a:fontRef>
-        </p:style>
-      </p:cxnSp>
-      <p:cxnSp>
-        <p:nvCxnSpPr>
-          <p:cNvPr id="43" name="Straight Arrow Connector 42"/>
-          <p:cNvCxnSpPr>
-            <a:stCxn id="34" idx="3"/>
-            <a:endCxn id="8" idx="1"/>
-          </p:cNvCxnSpPr>
-          <p:nvPr/>
-        </p:nvCxnSpPr>
-        <p:spPr>
-          <a:xfrm flipV="1">
-            <a:off x="2247900" y="2268388"/>
-            <a:ext cx="990600" cy="15815"/>
-          </a:xfrm>
-          <a:prstGeom prst="straightConnector1">
-            <a:avLst/>
-          </a:prstGeom>
-          <a:ln>
-            <a:tailEnd type="arrow"/>
-          </a:ln>
-        </p:spPr>
-        <p:style>
-          <a:lnRef idx="2">
-            <a:schemeClr val="dk1"/>
-          </a:lnRef>
-          <a:fillRef idx="0">
-            <a:schemeClr val="dk1"/>
-          </a:fillRef>
-          <a:effectRef idx="1">
-            <a:schemeClr val="dk1"/>
-          </a:effectRef>
-          <a:fontRef idx="minor">
-            <a:schemeClr val="tx1"/>
-          </a:fontRef>
-        </p:style>
-      </p:cxnSp>
-      <p:sp>
-        <p:nvSpPr>
-          <p:cNvPr id="44" name="Rectangle 43"/>
-          <p:cNvSpPr/>
-          <p:nvPr/>
-        </p:nvSpPr>
-        <p:spPr>
-          <a:xfrm>
-            <a:off x="1066800" y="4263606"/>
-            <a:ext cx="1181100" cy="987006"/>
-          </a:xfrm>
-          <a:prstGeom prst="rect">
-            <a:avLst/>
-          </a:prstGeom>
-        </p:spPr>
-        <p:style>
-          <a:lnRef idx="1">
-            <a:schemeClr val="accent1"/>
-          </a:lnRef>
-          <a:fillRef idx="2">
-            <a:schemeClr val="accent1"/>
-          </a:fillRef>
-          <a:effectRef idx="1">
-            <a:schemeClr val="accent1"/>
-          </a:effectRef>
-          <a:fontRef idx="minor">
-            <a:schemeClr val="dk1"/>
-          </a:fontRef>
-        </p:style>
-        <p:txBody>
-          <a:bodyPr rot="0" spcFirstLastPara="0" vertOverflow="overflow" horzOverflow="overflow" vert="horz" wrap="square" lIns="91440" tIns="45720" rIns="91440" bIns="45720" numCol="1" spcCol="0" rtlCol="0" fromWordArt="0" anchor="ctr" anchorCtr="0" forceAA="0" compatLnSpc="1">
-            <a:prstTxWarp prst="textNoShape">
+            </a:prstGeom>
+          </p:spPr>
+          <p:style>
+            <a:lnRef idx="2">
+              <a:schemeClr val="accent1">
+                <a:shade val="50000"/>
+              </a:schemeClr>
+            </a:lnRef>
+            <a:fillRef idx="1">
+              <a:schemeClr val="accent1"/>
+            </a:fillRef>
+            <a:effectRef idx="0">
+              <a:schemeClr val="accent1"/>
+            </a:effectRef>
+            <a:fontRef idx="minor">
+              <a:schemeClr val="lt1"/>
+            </a:fontRef>
+          </p:style>
+          <p:txBody>
+            <a:bodyPr rtlCol="0" anchor="t"/>
+            <a:lstStyle/>
+            <a:p>
+              <a:r>
+                <a:rPr lang="en-US" dirty="0" smtClean="0"/>
+                <a:t>Core Driver</a:t>
+              </a:r>
+              <a:endParaRPr lang="en-US" dirty="0"/>
+            </a:p>
+          </p:txBody>
+        </p:sp>
+        <p:grpSp>
+          <p:nvGrpSpPr>
+            <p:cNvPr id="18" name="Group 17"/>
+            <p:cNvGrpSpPr/>
+            <p:nvPr/>
+          </p:nvGrpSpPr>
+          <p:grpSpPr>
+            <a:xfrm>
+              <a:off x="381000" y="761999"/>
+              <a:ext cx="3200400" cy="3565733"/>
+              <a:chOff x="381000" y="761999"/>
+              <a:chExt cx="3200400" cy="3565733"/>
+            </a:xfrm>
+          </p:grpSpPr>
+          <p:sp>
+            <p:nvSpPr>
+              <p:cNvPr id="6" name="Rectangle 5"/>
+              <p:cNvSpPr/>
+              <p:nvPr/>
+            </p:nvSpPr>
+            <p:spPr>
+              <a:xfrm>
+                <a:off x="381000" y="761999"/>
+                <a:ext cx="3200400" cy="3565733"/>
+              </a:xfrm>
+              <a:prstGeom prst="rect">
+                <a:avLst/>
+              </a:prstGeom>
+            </p:spPr>
+            <p:style>
+              <a:lnRef idx="1">
+                <a:schemeClr val="accent5"/>
+              </a:lnRef>
+              <a:fillRef idx="2">
+                <a:schemeClr val="accent5"/>
+              </a:fillRef>
+              <a:effectRef idx="1">
+                <a:schemeClr val="accent5"/>
+              </a:effectRef>
+              <a:fontRef idx="minor">
+                <a:schemeClr val="dk1"/>
+              </a:fontRef>
+            </p:style>
+            <p:txBody>
+              <a:bodyPr rtlCol="0" anchor="t"/>
+              <a:lstStyle/>
+              <a:p>
+                <a:r>
+                  <a:rPr lang="en-US" smtClean="0"/>
+                  <a:t>Transaction </a:t>
+                </a:r>
+                <a:r>
+                  <a:rPr lang="en-US" dirty="0" smtClean="0"/>
+                  <a:t>Data Management</a:t>
+                </a:r>
+                <a:endParaRPr lang="en-US" dirty="0"/>
+              </a:p>
+            </p:txBody>
+          </p:sp>
+          <p:sp>
+            <p:nvSpPr>
+              <p:cNvPr id="44" name="Rectangle 43"/>
+              <p:cNvSpPr/>
+              <p:nvPr/>
+            </p:nvSpPr>
+            <p:spPr>
+              <a:xfrm>
+                <a:off x="457200" y="1219199"/>
+                <a:ext cx="2743200" cy="731520"/>
+              </a:xfrm>
+              <a:prstGeom prst="rect">
+                <a:avLst/>
+              </a:prstGeom>
+            </p:spPr>
+            <p:style>
+              <a:lnRef idx="1">
+                <a:schemeClr val="accent1"/>
+              </a:lnRef>
+              <a:fillRef idx="2">
+                <a:schemeClr val="accent1"/>
+              </a:fillRef>
+              <a:effectRef idx="1">
+                <a:schemeClr val="accent1"/>
+              </a:effectRef>
+              <a:fontRef idx="minor">
+                <a:schemeClr val="dk1"/>
+              </a:fontRef>
+            </p:style>
+            <p:txBody>
+              <a:bodyPr rot="0" spcFirstLastPara="0" vertOverflow="overflow" horzOverflow="overflow" vert="horz" wrap="square" lIns="91440" tIns="45720" rIns="91440" bIns="45720" numCol="1" spcCol="0" rtlCol="0" fromWordArt="0" anchor="ctr" anchorCtr="0" forceAA="0" compatLnSpc="1">
+                <a:prstTxWarp prst="textNoShape">
+                  <a:avLst/>
+                </a:prstTxWarp>
+                <a:noAutofit/>
+              </a:bodyPr>
+              <a:lstStyle/>
+              <a:p>
+                <a:pPr algn="ctr"/>
+                <a:r>
+                  <a:rPr lang="en-US" dirty="0" smtClean="0"/>
+                  <a:t>Month Ledger 2012_08</a:t>
+                </a:r>
+                <a:endParaRPr lang="en-US" dirty="0" smtClean="0"/>
+              </a:p>
+            </p:txBody>
+          </p:sp>
+          <p:sp>
+            <p:nvSpPr>
+              <p:cNvPr id="22" name="Rectangle 21"/>
+              <p:cNvSpPr/>
+              <p:nvPr/>
+            </p:nvSpPr>
+            <p:spPr>
+              <a:xfrm>
+                <a:off x="457200" y="1950719"/>
+                <a:ext cx="2743200" cy="731520"/>
+              </a:xfrm>
+              <a:prstGeom prst="rect">
+                <a:avLst/>
+              </a:prstGeom>
+            </p:spPr>
+            <p:style>
+              <a:lnRef idx="1">
+                <a:schemeClr val="accent1"/>
+              </a:lnRef>
+              <a:fillRef idx="2">
+                <a:schemeClr val="accent1"/>
+              </a:fillRef>
+              <a:effectRef idx="1">
+                <a:schemeClr val="accent1"/>
+              </a:effectRef>
+              <a:fontRef idx="minor">
+                <a:schemeClr val="dk1"/>
+              </a:fontRef>
+            </p:style>
+            <p:txBody>
+              <a:bodyPr rot="0" spcFirstLastPara="0" vertOverflow="overflow" horzOverflow="overflow" vert="horz" wrap="square" lIns="91440" tIns="45720" rIns="91440" bIns="45720" numCol="1" spcCol="0" rtlCol="0" fromWordArt="0" anchor="ctr" anchorCtr="0" forceAA="0" compatLnSpc="1">
+                <a:prstTxWarp prst="textNoShape">
+                  <a:avLst/>
+                </a:prstTxWarp>
+                <a:noAutofit/>
+              </a:bodyPr>
+              <a:lstStyle/>
+              <a:p>
+                <a:pPr algn="ctr"/>
+                <a:r>
+                  <a:rPr lang="en-US" dirty="0" smtClean="0"/>
+                  <a:t>Month Ledger 2012_09</a:t>
+                </a:r>
+                <a:endParaRPr lang="en-US" dirty="0" smtClean="0"/>
+              </a:p>
+            </p:txBody>
+          </p:sp>
+          <p:sp>
+            <p:nvSpPr>
+              <p:cNvPr id="23" name="Rectangle 22"/>
+              <p:cNvSpPr/>
+              <p:nvPr/>
+            </p:nvSpPr>
+            <p:spPr>
+              <a:xfrm>
+                <a:off x="457200" y="3412419"/>
+                <a:ext cx="2743200" cy="731520"/>
+              </a:xfrm>
+              <a:prstGeom prst="rect">
+                <a:avLst/>
+              </a:prstGeom>
+            </p:spPr>
+            <p:style>
+              <a:lnRef idx="1">
+                <a:schemeClr val="accent1"/>
+              </a:lnRef>
+              <a:fillRef idx="2">
+                <a:schemeClr val="accent1"/>
+              </a:fillRef>
+              <a:effectRef idx="1">
+                <a:schemeClr val="accent1"/>
+              </a:effectRef>
+              <a:fontRef idx="minor">
+                <a:schemeClr val="dk1"/>
+              </a:fontRef>
+            </p:style>
+            <p:txBody>
+              <a:bodyPr rot="0" spcFirstLastPara="0" vertOverflow="overflow" horzOverflow="overflow" vert="horz" wrap="square" lIns="91440" tIns="45720" rIns="91440" bIns="45720" numCol="1" spcCol="0" rtlCol="0" fromWordArt="0" anchor="ctr" anchorCtr="0" forceAA="0" compatLnSpc="1">
+                <a:prstTxWarp prst="textNoShape">
+                  <a:avLst/>
+                </a:prstTxWarp>
+                <a:noAutofit/>
+              </a:bodyPr>
+              <a:lstStyle/>
+              <a:p>
+                <a:pPr algn="ctr"/>
+                <a:r>
+                  <a:rPr lang="en-US" dirty="0" smtClean="0"/>
+                  <a:t>Month Ledger …</a:t>
+                </a:r>
+                <a:endParaRPr lang="en-US" dirty="0" smtClean="0"/>
+              </a:p>
+            </p:txBody>
+          </p:sp>
+          <p:sp>
+            <p:nvSpPr>
+              <p:cNvPr id="24" name="Rectangle 23"/>
+              <p:cNvSpPr/>
+              <p:nvPr/>
+            </p:nvSpPr>
+            <p:spPr>
+              <a:xfrm>
+                <a:off x="457200" y="2681789"/>
+                <a:ext cx="2743200" cy="731520"/>
+              </a:xfrm>
+              <a:prstGeom prst="rect">
+                <a:avLst/>
+              </a:prstGeom>
+            </p:spPr>
+            <p:style>
+              <a:lnRef idx="1">
+                <a:schemeClr val="accent1"/>
+              </a:lnRef>
+              <a:fillRef idx="2">
+                <a:schemeClr val="accent1"/>
+              </a:fillRef>
+              <a:effectRef idx="1">
+                <a:schemeClr val="accent1"/>
+              </a:effectRef>
+              <a:fontRef idx="minor">
+                <a:schemeClr val="dk1"/>
+              </a:fontRef>
+            </p:style>
+            <p:txBody>
+              <a:bodyPr rot="0" spcFirstLastPara="0" vertOverflow="overflow" horzOverflow="overflow" vert="horz" wrap="square" lIns="91440" tIns="45720" rIns="91440" bIns="45720" numCol="1" spcCol="0" rtlCol="0" fromWordArt="0" anchor="ctr" anchorCtr="0" forceAA="0" compatLnSpc="1">
+                <a:prstTxWarp prst="textNoShape">
+                  <a:avLst/>
+                </a:prstTxWarp>
+                <a:noAutofit/>
+              </a:bodyPr>
+              <a:lstStyle/>
+              <a:p>
+                <a:pPr algn="ctr"/>
+                <a:r>
+                  <a:rPr lang="en-US" dirty="0" smtClean="0"/>
+                  <a:t>Month Ledger 2012_10</a:t>
+                </a:r>
+                <a:endParaRPr lang="en-US" dirty="0" smtClean="0"/>
+              </a:p>
+            </p:txBody>
+          </p:sp>
+        </p:grpSp>
+        <p:sp>
+          <p:nvSpPr>
+            <p:cNvPr id="13" name="Down Arrow 12"/>
+            <p:cNvSpPr/>
+            <p:nvPr/>
+          </p:nvSpPr>
+          <p:spPr>
+            <a:xfrm rot="10800000">
+              <a:off x="1733187" y="4361241"/>
+              <a:ext cx="484632" cy="499890"/>
+            </a:xfrm>
+            <a:prstGeom prst="downArrow">
               <a:avLst/>
-            </a:prstTxWarp>
-            <a:noAutofit/>
-          </a:bodyPr>
-          <a:lstStyle/>
-          <a:p>
-            <a:pPr algn="ctr"/>
-            <a:r>
-              <a:rPr lang="en-US" dirty="0" smtClean="0"/>
-              <a:t>Month End Close</a:t>
-            </a:r>
-          </a:p>
-        </p:txBody>
-      </p:sp>
-      <p:cxnSp>
-        <p:nvCxnSpPr>
-          <p:cNvPr id="45" name="Elbow Connector 44"/>
-          <p:cNvCxnSpPr>
-            <a:stCxn id="44" idx="3"/>
-            <a:endCxn id="8" idx="1"/>
-          </p:cNvCxnSpPr>
-          <p:nvPr/>
-        </p:nvCxnSpPr>
-        <p:spPr>
-          <a:xfrm flipV="1">
-            <a:off x="2247900" y="2268388"/>
-            <a:ext cx="990600" cy="2488721"/>
-          </a:xfrm>
-          <a:prstGeom prst="bentConnector3">
-            <a:avLst>
-              <a:gd name="adj1" fmla="val 50000"/>
-            </a:avLst>
-          </a:prstGeom>
-          <a:ln>
-            <a:tailEnd type="arrow"/>
-          </a:ln>
-        </p:spPr>
-        <p:style>
-          <a:lnRef idx="2">
-            <a:schemeClr val="dk1"/>
-          </a:lnRef>
-          <a:fillRef idx="0">
-            <a:schemeClr val="dk1"/>
-          </a:fillRef>
-          <a:effectRef idx="1">
-            <a:schemeClr val="dk1"/>
-          </a:effectRef>
-          <a:fontRef idx="minor">
-            <a:schemeClr val="tx1"/>
-          </a:fontRef>
-        </p:style>
-      </p:cxnSp>
-      <p:cxnSp>
-        <p:nvCxnSpPr>
-          <p:cNvPr id="49" name="Elbow Connector 48"/>
-          <p:cNvCxnSpPr>
-            <a:stCxn id="26" idx="1"/>
-            <a:endCxn id="44" idx="2"/>
-          </p:cNvCxnSpPr>
-          <p:nvPr/>
-        </p:nvCxnSpPr>
-        <p:spPr>
-          <a:xfrm rot="10800000" flipV="1">
-            <a:off x="1657350" y="3579602"/>
-            <a:ext cx="1581150" cy="1671009"/>
-          </a:xfrm>
-          <a:prstGeom prst="bentConnector4">
-            <a:avLst>
-              <a:gd name="adj1" fmla="val 18231"/>
-              <a:gd name="adj2" fmla="val 113680"/>
-            </a:avLst>
-          </a:prstGeom>
-          <a:ln>
-            <a:tailEnd type="arrow"/>
-          </a:ln>
-        </p:spPr>
-        <p:style>
-          <a:lnRef idx="2">
-            <a:schemeClr val="dk1"/>
-          </a:lnRef>
-          <a:fillRef idx="0">
-            <a:schemeClr val="dk1"/>
-          </a:fillRef>
-          <a:effectRef idx="1">
-            <a:schemeClr val="dk1"/>
-          </a:effectRef>
-          <a:fontRef idx="minor">
-            <a:schemeClr val="tx1"/>
-          </a:fontRef>
-        </p:style>
-      </p:cxnSp>
+            </a:prstGeom>
+          </p:spPr>
+          <p:style>
+            <a:lnRef idx="0">
+              <a:schemeClr val="accent5"/>
+            </a:lnRef>
+            <a:fillRef idx="3">
+              <a:schemeClr val="accent5"/>
+            </a:fillRef>
+            <a:effectRef idx="3">
+              <a:schemeClr val="accent5"/>
+            </a:effectRef>
+            <a:fontRef idx="minor">
+              <a:schemeClr val="lt1"/>
+            </a:fontRef>
+          </p:style>
+          <p:txBody>
+            <a:bodyPr rtlCol="0" anchor="ctr"/>
+            <a:lstStyle/>
+            <a:p>
+              <a:pPr algn="ctr"/>
+              <a:endParaRPr lang="en-US" dirty="0" smtClean="0"/>
+            </a:p>
+          </p:txBody>
+        </p:sp>
+        <p:grpSp>
+          <p:nvGrpSpPr>
+            <p:cNvPr id="19" name="Group 18"/>
+            <p:cNvGrpSpPr/>
+            <p:nvPr/>
+          </p:nvGrpSpPr>
+          <p:grpSpPr>
+            <a:xfrm>
+              <a:off x="381000" y="4894640"/>
+              <a:ext cx="3200400" cy="1622854"/>
+              <a:chOff x="381000" y="4894640"/>
+              <a:chExt cx="3200400" cy="1622854"/>
+            </a:xfrm>
+          </p:grpSpPr>
+          <p:sp>
+            <p:nvSpPr>
+              <p:cNvPr id="5" name="Rectangle 4"/>
+              <p:cNvSpPr/>
+              <p:nvPr/>
+            </p:nvSpPr>
+            <p:spPr>
+              <a:xfrm>
+                <a:off x="381000" y="4894640"/>
+                <a:ext cx="3200400" cy="1622854"/>
+              </a:xfrm>
+              <a:prstGeom prst="rect">
+                <a:avLst/>
+              </a:prstGeom>
+            </p:spPr>
+            <p:style>
+              <a:lnRef idx="1">
+                <a:schemeClr val="accent1"/>
+              </a:lnRef>
+              <a:fillRef idx="2">
+                <a:schemeClr val="accent1"/>
+              </a:fillRef>
+              <a:effectRef idx="1">
+                <a:schemeClr val="accent1"/>
+              </a:effectRef>
+              <a:fontRef idx="minor">
+                <a:schemeClr val="dk1"/>
+              </a:fontRef>
+            </p:style>
+            <p:txBody>
+              <a:bodyPr rtlCol="0" anchor="t"/>
+              <a:lstStyle/>
+              <a:p>
+                <a:r>
+                  <a:rPr lang="en-US" dirty="0" smtClean="0"/>
+                  <a:t>Master Data Management</a:t>
+                </a:r>
+                <a:endParaRPr lang="en-US" dirty="0"/>
+              </a:p>
+            </p:txBody>
+          </p:sp>
+          <p:sp>
+            <p:nvSpPr>
+              <p:cNvPr id="30" name="Rectangle 29"/>
+              <p:cNvSpPr/>
+              <p:nvPr/>
+            </p:nvSpPr>
+            <p:spPr>
+              <a:xfrm>
+                <a:off x="457200" y="5257800"/>
+                <a:ext cx="2743200" cy="548640"/>
+              </a:xfrm>
+              <a:prstGeom prst="rect">
+                <a:avLst/>
+              </a:prstGeom>
+            </p:spPr>
+            <p:style>
+              <a:lnRef idx="1">
+                <a:schemeClr val="accent5"/>
+              </a:lnRef>
+              <a:fillRef idx="2">
+                <a:schemeClr val="accent5"/>
+              </a:fillRef>
+              <a:effectRef idx="1">
+                <a:schemeClr val="accent5"/>
+              </a:effectRef>
+              <a:fontRef idx="minor">
+                <a:schemeClr val="dk1"/>
+              </a:fontRef>
+            </p:style>
+            <p:txBody>
+              <a:bodyPr rot="0" spcFirstLastPara="0" vertOverflow="overflow" horzOverflow="overflow" vert="horz" wrap="square" lIns="91440" tIns="45720" rIns="91440" bIns="45720" numCol="1" spcCol="0" rtlCol="0" fromWordArt="0" anchor="ctr" anchorCtr="0" forceAA="0" compatLnSpc="1">
+                <a:prstTxWarp prst="textNoShape">
+                  <a:avLst/>
+                </a:prstTxWarp>
+                <a:noAutofit/>
+              </a:bodyPr>
+              <a:lstStyle/>
+              <a:p>
+                <a:pPr algn="ctr"/>
+                <a:r>
+                  <a:rPr lang="en-US" dirty="0" smtClean="0"/>
+                  <a:t>G\L Account Factory</a:t>
+                </a:r>
+                <a:endParaRPr lang="en-US" dirty="0" smtClean="0"/>
+              </a:p>
+            </p:txBody>
+          </p:sp>
+          <p:sp>
+            <p:nvSpPr>
+              <p:cNvPr id="31" name="Rectangle 30"/>
+              <p:cNvSpPr/>
+              <p:nvPr/>
+            </p:nvSpPr>
+            <p:spPr>
+              <a:xfrm>
+                <a:off x="457200" y="5806440"/>
+                <a:ext cx="2743200" cy="548640"/>
+              </a:xfrm>
+              <a:prstGeom prst="rect">
+                <a:avLst/>
+              </a:prstGeom>
+            </p:spPr>
+            <p:style>
+              <a:lnRef idx="1">
+                <a:schemeClr val="accent5"/>
+              </a:lnRef>
+              <a:fillRef idx="2">
+                <a:schemeClr val="accent5"/>
+              </a:fillRef>
+              <a:effectRef idx="1">
+                <a:schemeClr val="accent5"/>
+              </a:effectRef>
+              <a:fontRef idx="minor">
+                <a:schemeClr val="dk1"/>
+              </a:fontRef>
+            </p:style>
+            <p:txBody>
+              <a:bodyPr rot="0" spcFirstLastPara="0" vertOverflow="overflow" horzOverflow="overflow" vert="horz" wrap="square" lIns="91440" tIns="45720" rIns="91440" bIns="45720" numCol="1" spcCol="0" rtlCol="0" fromWordArt="0" anchor="ctr" anchorCtr="0" forceAA="0" compatLnSpc="1">
+                <a:prstTxWarp prst="textNoShape">
+                  <a:avLst/>
+                </a:prstTxWarp>
+                <a:noAutofit/>
+              </a:bodyPr>
+              <a:lstStyle/>
+              <a:p>
+                <a:pPr algn="ctr"/>
+                <a:r>
+                  <a:rPr lang="en-US" dirty="0" smtClean="0"/>
+                  <a:t>Factory …</a:t>
+                </a:r>
+                <a:endParaRPr lang="en-US" dirty="0" smtClean="0"/>
+              </a:p>
+            </p:txBody>
+          </p:sp>
+        </p:grpSp>
+        <p:grpSp>
+          <p:nvGrpSpPr>
+            <p:cNvPr id="27" name="Group 26"/>
+            <p:cNvGrpSpPr/>
+            <p:nvPr/>
+          </p:nvGrpSpPr>
+          <p:grpSpPr>
+            <a:xfrm>
+              <a:off x="4413012" y="761998"/>
+              <a:ext cx="3061175" cy="2819402"/>
+              <a:chOff x="4413012" y="761998"/>
+              <a:chExt cx="3061175" cy="2819402"/>
+            </a:xfrm>
+          </p:grpSpPr>
+          <p:sp>
+            <p:nvSpPr>
+              <p:cNvPr id="32" name="Rectangle 31"/>
+              <p:cNvSpPr/>
+              <p:nvPr/>
+            </p:nvSpPr>
+            <p:spPr>
+              <a:xfrm>
+                <a:off x="4413012" y="761998"/>
+                <a:ext cx="3061175" cy="2819402"/>
+              </a:xfrm>
+              <a:prstGeom prst="rect">
+                <a:avLst/>
+              </a:prstGeom>
+            </p:spPr>
+            <p:style>
+              <a:lnRef idx="1">
+                <a:schemeClr val="accent4"/>
+              </a:lnRef>
+              <a:fillRef idx="2">
+                <a:schemeClr val="accent4"/>
+              </a:fillRef>
+              <a:effectRef idx="1">
+                <a:schemeClr val="accent4"/>
+              </a:effectRef>
+              <a:fontRef idx="minor">
+                <a:schemeClr val="dk1"/>
+              </a:fontRef>
+            </p:style>
+            <p:txBody>
+              <a:bodyPr rtlCol="0" anchor="t"/>
+              <a:lstStyle/>
+              <a:p>
+                <a:r>
+                  <a:rPr lang="en-US" dirty="0" smtClean="0"/>
+                  <a:t>Entry Template </a:t>
+                </a:r>
+                <a:r>
+                  <a:rPr lang="en-US" dirty="0" smtClean="0"/>
+                  <a:t>Management</a:t>
+                </a:r>
+                <a:endParaRPr lang="en-US" dirty="0"/>
+              </a:p>
+            </p:txBody>
+          </p:sp>
+          <p:sp>
+            <p:nvSpPr>
+              <p:cNvPr id="33" name="Rectangle 32"/>
+              <p:cNvSpPr/>
+              <p:nvPr/>
+            </p:nvSpPr>
+            <p:spPr>
+              <a:xfrm>
+                <a:off x="4554196" y="1143000"/>
+                <a:ext cx="2743200" cy="548640"/>
+              </a:xfrm>
+              <a:prstGeom prst="rect">
+                <a:avLst/>
+              </a:prstGeom>
+            </p:spPr>
+            <p:style>
+              <a:lnRef idx="1">
+                <a:schemeClr val="accent1"/>
+              </a:lnRef>
+              <a:fillRef idx="2">
+                <a:schemeClr val="accent1"/>
+              </a:fillRef>
+              <a:effectRef idx="1">
+                <a:schemeClr val="accent1"/>
+              </a:effectRef>
+              <a:fontRef idx="minor">
+                <a:schemeClr val="dk1"/>
+              </a:fontRef>
+            </p:style>
+            <p:txBody>
+              <a:bodyPr rot="0" spcFirstLastPara="0" vertOverflow="overflow" horzOverflow="overflow" vert="horz" wrap="square" lIns="91440" tIns="45720" rIns="91440" bIns="45720" numCol="1" spcCol="0" rtlCol="0" fromWordArt="0" anchor="ctr" anchorCtr="0" forceAA="0" compatLnSpc="1">
+                <a:prstTxWarp prst="textNoShape">
+                  <a:avLst/>
+                </a:prstTxWarp>
+                <a:noAutofit/>
+              </a:bodyPr>
+              <a:lstStyle/>
+              <a:p>
+                <a:pPr algn="ctr"/>
+                <a:r>
+                  <a:rPr lang="en-US" dirty="0" smtClean="0"/>
+                  <a:t>Outgoing Entry</a:t>
+                </a:r>
+                <a:endParaRPr lang="en-US" dirty="0" smtClean="0"/>
+              </a:p>
+            </p:txBody>
+          </p:sp>
+          <p:sp>
+            <p:nvSpPr>
+              <p:cNvPr id="35" name="Rectangle 34"/>
+              <p:cNvSpPr/>
+              <p:nvPr/>
+            </p:nvSpPr>
+            <p:spPr>
+              <a:xfrm>
+                <a:off x="4554196" y="1692210"/>
+                <a:ext cx="2743200" cy="548640"/>
+              </a:xfrm>
+              <a:prstGeom prst="rect">
+                <a:avLst/>
+              </a:prstGeom>
+            </p:spPr>
+            <p:style>
+              <a:lnRef idx="1">
+                <a:schemeClr val="accent1"/>
+              </a:lnRef>
+              <a:fillRef idx="2">
+                <a:schemeClr val="accent1"/>
+              </a:fillRef>
+              <a:effectRef idx="1">
+                <a:schemeClr val="accent1"/>
+              </a:effectRef>
+              <a:fontRef idx="minor">
+                <a:schemeClr val="dk1"/>
+              </a:fontRef>
+            </p:style>
+            <p:txBody>
+              <a:bodyPr rot="0" spcFirstLastPara="0" vertOverflow="overflow" horzOverflow="overflow" vert="horz" wrap="square" lIns="91440" tIns="45720" rIns="91440" bIns="45720" numCol="1" spcCol="0" rtlCol="0" fromWordArt="0" anchor="ctr" anchorCtr="0" forceAA="0" compatLnSpc="1">
+                <a:prstTxWarp prst="textNoShape">
+                  <a:avLst/>
+                </a:prstTxWarp>
+                <a:noAutofit/>
+              </a:bodyPr>
+              <a:lstStyle/>
+              <a:p>
+                <a:pPr algn="ctr"/>
+                <a:r>
+                  <a:rPr lang="en-US" dirty="0" smtClean="0"/>
+                  <a:t>Incoming Entry</a:t>
+                </a:r>
+                <a:endParaRPr lang="en-US" dirty="0" smtClean="0"/>
+              </a:p>
+            </p:txBody>
+          </p:sp>
+          <p:sp>
+            <p:nvSpPr>
+              <p:cNvPr id="36" name="Rectangle 35"/>
+              <p:cNvSpPr/>
+              <p:nvPr/>
+            </p:nvSpPr>
+            <p:spPr>
+              <a:xfrm>
+                <a:off x="4558469" y="2240850"/>
+                <a:ext cx="2743200" cy="548640"/>
+              </a:xfrm>
+              <a:prstGeom prst="rect">
+                <a:avLst/>
+              </a:prstGeom>
+            </p:spPr>
+            <p:style>
+              <a:lnRef idx="1">
+                <a:schemeClr val="accent1"/>
+              </a:lnRef>
+              <a:fillRef idx="2">
+                <a:schemeClr val="accent1"/>
+              </a:fillRef>
+              <a:effectRef idx="1">
+                <a:schemeClr val="accent1"/>
+              </a:effectRef>
+              <a:fontRef idx="minor">
+                <a:schemeClr val="dk1"/>
+              </a:fontRef>
+            </p:style>
+            <p:txBody>
+              <a:bodyPr rot="0" spcFirstLastPara="0" vertOverflow="overflow" horzOverflow="overflow" vert="horz" wrap="square" lIns="91440" tIns="45720" rIns="91440" bIns="45720" numCol="1" spcCol="0" rtlCol="0" fromWordArt="0" anchor="ctr" anchorCtr="0" forceAA="0" compatLnSpc="1">
+                <a:prstTxWarp prst="textNoShape">
+                  <a:avLst/>
+                </a:prstTxWarp>
+                <a:noAutofit/>
+              </a:bodyPr>
+              <a:lstStyle/>
+              <a:p>
+                <a:pPr algn="ctr"/>
+                <a:r>
+                  <a:rPr lang="en-US" dirty="0" smtClean="0"/>
+                  <a:t>Internal Entry</a:t>
+                </a:r>
+                <a:endParaRPr lang="en-US" dirty="0" smtClean="0"/>
+              </a:p>
+            </p:txBody>
+          </p:sp>
+          <p:sp>
+            <p:nvSpPr>
+              <p:cNvPr id="37" name="Rectangle 36"/>
+              <p:cNvSpPr/>
+              <p:nvPr/>
+            </p:nvSpPr>
+            <p:spPr>
+              <a:xfrm>
+                <a:off x="4554196" y="2789490"/>
+                <a:ext cx="2743200" cy="548640"/>
+              </a:xfrm>
+              <a:prstGeom prst="rect">
+                <a:avLst/>
+              </a:prstGeom>
+            </p:spPr>
+            <p:style>
+              <a:lnRef idx="1">
+                <a:schemeClr val="accent1"/>
+              </a:lnRef>
+              <a:fillRef idx="2">
+                <a:schemeClr val="accent1"/>
+              </a:fillRef>
+              <a:effectRef idx="1">
+                <a:schemeClr val="accent1"/>
+              </a:effectRef>
+              <a:fontRef idx="minor">
+                <a:schemeClr val="dk1"/>
+              </a:fontRef>
+            </p:style>
+            <p:txBody>
+              <a:bodyPr rot="0" spcFirstLastPara="0" vertOverflow="overflow" horzOverflow="overflow" vert="horz" wrap="square" lIns="91440" tIns="45720" rIns="91440" bIns="45720" numCol="1" spcCol="0" rtlCol="0" fromWordArt="0" anchor="ctr" anchorCtr="0" forceAA="0" compatLnSpc="1">
+                <a:prstTxWarp prst="textNoShape">
+                  <a:avLst/>
+                </a:prstTxWarp>
+                <a:noAutofit/>
+              </a:bodyPr>
+              <a:lstStyle/>
+              <a:p>
+                <a:pPr algn="ctr"/>
+                <a:r>
+                  <a:rPr lang="en-US" dirty="0" smtClean="0"/>
+                  <a:t>Other Entries …</a:t>
+                </a:r>
+                <a:endParaRPr lang="en-US" dirty="0" smtClean="0"/>
+              </a:p>
+            </p:txBody>
+          </p:sp>
+        </p:grpSp>
+        <p:sp>
+          <p:nvSpPr>
+            <p:cNvPr id="14" name="Right Arrow 13"/>
+            <p:cNvSpPr/>
+            <p:nvPr/>
+          </p:nvSpPr>
+          <p:spPr>
+            <a:xfrm>
+              <a:off x="3733800" y="2171699"/>
+              <a:ext cx="533400" cy="510090"/>
+            </a:xfrm>
+            <a:prstGeom prst="rightArrow">
+              <a:avLst/>
+            </a:prstGeom>
+          </p:spPr>
+          <p:style>
+            <a:lnRef idx="0">
+              <a:schemeClr val="accent5"/>
+            </a:lnRef>
+            <a:fillRef idx="3">
+              <a:schemeClr val="accent5"/>
+            </a:fillRef>
+            <a:effectRef idx="3">
+              <a:schemeClr val="accent5"/>
+            </a:effectRef>
+            <a:fontRef idx="minor">
+              <a:schemeClr val="lt1"/>
+            </a:fontRef>
+          </p:style>
+          <p:txBody>
+            <a:bodyPr rtlCol="0" anchor="ctr"/>
+            <a:lstStyle/>
+            <a:p>
+              <a:pPr algn="ctr"/>
+              <a:endParaRPr lang="en-US" dirty="0" smtClean="0"/>
+            </a:p>
+          </p:txBody>
+        </p:sp>
+        <p:sp>
+          <p:nvSpPr>
+            <p:cNvPr id="42" name="Right Arrow 41"/>
+            <p:cNvSpPr/>
+            <p:nvPr/>
+          </p:nvSpPr>
+          <p:spPr>
+            <a:xfrm rot="2004834">
+              <a:off x="3669147" y="4307274"/>
+              <a:ext cx="774148" cy="510090"/>
+            </a:xfrm>
+            <a:prstGeom prst="rightArrow">
+              <a:avLst/>
+            </a:prstGeom>
+          </p:spPr>
+          <p:style>
+            <a:lnRef idx="0">
+              <a:schemeClr val="accent5"/>
+            </a:lnRef>
+            <a:fillRef idx="3">
+              <a:schemeClr val="accent5"/>
+            </a:fillRef>
+            <a:effectRef idx="3">
+              <a:schemeClr val="accent5"/>
+            </a:effectRef>
+            <a:fontRef idx="minor">
+              <a:schemeClr val="lt1"/>
+            </a:fontRef>
+          </p:style>
+          <p:txBody>
+            <a:bodyPr rtlCol="0" anchor="ctr"/>
+            <a:lstStyle/>
+            <a:p>
+              <a:pPr algn="ctr"/>
+              <a:endParaRPr lang="en-US" dirty="0" smtClean="0"/>
+            </a:p>
+          </p:txBody>
+        </p:sp>
+        <p:sp>
+          <p:nvSpPr>
+            <p:cNvPr id="47" name="Rectangle 46"/>
+            <p:cNvSpPr/>
+            <p:nvPr/>
+          </p:nvSpPr>
+          <p:spPr>
+            <a:xfrm>
+              <a:off x="4547236" y="4703973"/>
+              <a:ext cx="2743200" cy="548640"/>
+            </a:xfrm>
+            <a:prstGeom prst="rect">
+              <a:avLst/>
+            </a:prstGeom>
+          </p:spPr>
+          <p:style>
+            <a:lnRef idx="1">
+              <a:schemeClr val="accent1"/>
+            </a:lnRef>
+            <a:fillRef idx="2">
+              <a:schemeClr val="accent1"/>
+            </a:fillRef>
+            <a:effectRef idx="1">
+              <a:schemeClr val="accent1"/>
+            </a:effectRef>
+            <a:fontRef idx="minor">
+              <a:schemeClr val="dk1"/>
+            </a:fontRef>
+          </p:style>
+          <p:txBody>
+            <a:bodyPr rot="0" spcFirstLastPara="0" vertOverflow="overflow" horzOverflow="overflow" vert="horz" wrap="square" lIns="91440" tIns="45720" rIns="91440" bIns="45720" numCol="1" spcCol="0" rtlCol="0" fromWordArt="0" anchor="ctr" anchorCtr="0" forceAA="0" compatLnSpc="1">
+              <a:prstTxWarp prst="textNoShape">
+                <a:avLst/>
+              </a:prstTxWarp>
+              <a:noAutofit/>
+            </a:bodyPr>
+            <a:lstStyle/>
+            <a:p>
+              <a:pPr algn="ctr"/>
+              <a:r>
+                <a:rPr lang="en-US" dirty="0" smtClean="0"/>
+                <a:t>Investment Account 2</a:t>
+              </a:r>
+              <a:endParaRPr lang="en-US" dirty="0" smtClean="0"/>
+            </a:p>
+          </p:txBody>
+        </p:sp>
+        <p:grpSp>
+          <p:nvGrpSpPr>
+            <p:cNvPr id="25" name="Group 24"/>
+            <p:cNvGrpSpPr/>
+            <p:nvPr/>
+          </p:nvGrpSpPr>
+          <p:grpSpPr>
+            <a:xfrm>
+              <a:off x="4415861" y="3736125"/>
+              <a:ext cx="3061175" cy="2283675"/>
+              <a:chOff x="4415861" y="3736125"/>
+              <a:chExt cx="3061175" cy="2283675"/>
+            </a:xfrm>
+          </p:grpSpPr>
+          <p:sp>
+            <p:nvSpPr>
+              <p:cNvPr id="41" name="Rectangle 40"/>
+              <p:cNvSpPr/>
+              <p:nvPr/>
+            </p:nvSpPr>
+            <p:spPr>
+              <a:xfrm>
+                <a:off x="4415861" y="3736125"/>
+                <a:ext cx="3061175" cy="2283675"/>
+              </a:xfrm>
+              <a:prstGeom prst="rect">
+                <a:avLst/>
+              </a:prstGeom>
+            </p:spPr>
+            <p:style>
+              <a:lnRef idx="1">
+                <a:schemeClr val="accent4"/>
+              </a:lnRef>
+              <a:fillRef idx="2">
+                <a:schemeClr val="accent4"/>
+              </a:fillRef>
+              <a:effectRef idx="1">
+                <a:schemeClr val="accent4"/>
+              </a:effectRef>
+              <a:fontRef idx="minor">
+                <a:schemeClr val="dk1"/>
+              </a:fontRef>
+            </p:style>
+            <p:txBody>
+              <a:bodyPr rtlCol="0" anchor="t"/>
+              <a:lstStyle/>
+              <a:p>
+                <a:r>
+                  <a:rPr lang="en-US" dirty="0" smtClean="0"/>
+                  <a:t>Investment </a:t>
+                </a:r>
+                <a:r>
+                  <a:rPr lang="en-US" dirty="0" smtClean="0"/>
+                  <a:t>Management</a:t>
+                </a:r>
+                <a:endParaRPr lang="en-US" dirty="0"/>
+              </a:p>
+            </p:txBody>
+          </p:sp>
+          <p:sp>
+            <p:nvSpPr>
+              <p:cNvPr id="46" name="Rectangle 45"/>
+              <p:cNvSpPr/>
+              <p:nvPr/>
+            </p:nvSpPr>
+            <p:spPr>
+              <a:xfrm>
+                <a:off x="4548499" y="4155333"/>
+                <a:ext cx="2743200" cy="548640"/>
+              </a:xfrm>
+              <a:prstGeom prst="rect">
+                <a:avLst/>
+              </a:prstGeom>
+            </p:spPr>
+            <p:style>
+              <a:lnRef idx="1">
+                <a:schemeClr val="accent1"/>
+              </a:lnRef>
+              <a:fillRef idx="2">
+                <a:schemeClr val="accent1"/>
+              </a:fillRef>
+              <a:effectRef idx="1">
+                <a:schemeClr val="accent1"/>
+              </a:effectRef>
+              <a:fontRef idx="minor">
+                <a:schemeClr val="dk1"/>
+              </a:fontRef>
+            </p:style>
+            <p:txBody>
+              <a:bodyPr rot="0" spcFirstLastPara="0" vertOverflow="overflow" horzOverflow="overflow" vert="horz" wrap="square" lIns="91440" tIns="45720" rIns="91440" bIns="45720" numCol="1" spcCol="0" rtlCol="0" fromWordArt="0" anchor="ctr" anchorCtr="0" forceAA="0" compatLnSpc="1">
+                <a:prstTxWarp prst="textNoShape">
+                  <a:avLst/>
+                </a:prstTxWarp>
+                <a:noAutofit/>
+              </a:bodyPr>
+              <a:lstStyle/>
+              <a:p>
+                <a:pPr algn="ctr"/>
+                <a:r>
+                  <a:rPr lang="en-US" dirty="0" smtClean="0"/>
+                  <a:t>Investment Account 1</a:t>
+                </a:r>
+                <a:endParaRPr lang="en-US" dirty="0" smtClean="0"/>
+              </a:p>
+            </p:txBody>
+          </p:sp>
+          <p:sp>
+            <p:nvSpPr>
+              <p:cNvPr id="48" name="Rectangle 47"/>
+              <p:cNvSpPr/>
+              <p:nvPr/>
+            </p:nvSpPr>
+            <p:spPr>
+              <a:xfrm>
+                <a:off x="4547236" y="5257800"/>
+                <a:ext cx="2743200" cy="548640"/>
+              </a:xfrm>
+              <a:prstGeom prst="rect">
+                <a:avLst/>
+              </a:prstGeom>
+            </p:spPr>
+            <p:style>
+              <a:lnRef idx="1">
+                <a:schemeClr val="accent1"/>
+              </a:lnRef>
+              <a:fillRef idx="2">
+                <a:schemeClr val="accent1"/>
+              </a:fillRef>
+              <a:effectRef idx="1">
+                <a:schemeClr val="accent1"/>
+              </a:effectRef>
+              <a:fontRef idx="minor">
+                <a:schemeClr val="dk1"/>
+              </a:fontRef>
+            </p:style>
+            <p:txBody>
+              <a:bodyPr rot="0" spcFirstLastPara="0" vertOverflow="overflow" horzOverflow="overflow" vert="horz" wrap="square" lIns="91440" tIns="45720" rIns="91440" bIns="45720" numCol="1" spcCol="0" rtlCol="0" fromWordArt="0" anchor="ctr" anchorCtr="0" forceAA="0" compatLnSpc="1">
+                <a:prstTxWarp prst="textNoShape">
+                  <a:avLst/>
+                </a:prstTxWarp>
+                <a:noAutofit/>
+              </a:bodyPr>
+              <a:lstStyle/>
+              <a:p>
+                <a:pPr algn="ctr"/>
+                <a:r>
+                  <a:rPr lang="en-US" dirty="0" smtClean="0"/>
+                  <a:t>Investment Account …</a:t>
+                </a:r>
+                <a:endParaRPr lang="en-US" dirty="0" smtClean="0"/>
+              </a:p>
+            </p:txBody>
+          </p:sp>
+        </p:grpSp>
+      </p:grpSp>
     </p:spTree>
     <p:extLst>
       <p:ext uri="{BB962C8B-B14F-4D97-AF65-F5344CB8AC3E}">

</xml_diff>